<commit_message>
Rename "final" stage to AIDS
</commit_message>
<xml_diff>
--- a/2019-03-HIV/HIV Model Diagram.pptx
+++ b/2019-03-HIV/HIV Model Diagram.pptx
@@ -262,7 +262,7 @@
           <a:p>
             <a:fld id="{9A35B5DD-C362-4A4F-89C2-BFD6EBD4AFC4}" type="datetimeFigureOut">
               <a:rPr lang="en-US" smtClean="0"/>
-              <a:t>4/26/2019</a:t>
+              <a:t>5/9/19</a:t>
             </a:fld>
             <a:endParaRPr lang="en-US"/>
           </a:p>
@@ -460,7 +460,7 @@
           <a:p>
             <a:fld id="{9A35B5DD-C362-4A4F-89C2-BFD6EBD4AFC4}" type="datetimeFigureOut">
               <a:rPr lang="en-US" smtClean="0"/>
-              <a:t>4/26/2019</a:t>
+              <a:t>5/9/19</a:t>
             </a:fld>
             <a:endParaRPr lang="en-US"/>
           </a:p>
@@ -668,7 +668,7 @@
           <a:p>
             <a:fld id="{9A35B5DD-C362-4A4F-89C2-BFD6EBD4AFC4}" type="datetimeFigureOut">
               <a:rPr lang="en-US" smtClean="0"/>
-              <a:t>4/26/2019</a:t>
+              <a:t>5/9/19</a:t>
             </a:fld>
             <a:endParaRPr lang="en-US"/>
           </a:p>
@@ -866,7 +866,7 @@
           <a:p>
             <a:fld id="{9A35B5DD-C362-4A4F-89C2-BFD6EBD4AFC4}" type="datetimeFigureOut">
               <a:rPr lang="en-US" smtClean="0"/>
-              <a:t>4/26/2019</a:t>
+              <a:t>5/9/19</a:t>
             </a:fld>
             <a:endParaRPr lang="en-US"/>
           </a:p>
@@ -1141,7 +1141,7 @@
           <a:p>
             <a:fld id="{9A35B5DD-C362-4A4F-89C2-BFD6EBD4AFC4}" type="datetimeFigureOut">
               <a:rPr lang="en-US" smtClean="0"/>
-              <a:t>4/26/2019</a:t>
+              <a:t>5/9/19</a:t>
             </a:fld>
             <a:endParaRPr lang="en-US"/>
           </a:p>
@@ -1406,7 +1406,7 @@
           <a:p>
             <a:fld id="{9A35B5DD-C362-4A4F-89C2-BFD6EBD4AFC4}" type="datetimeFigureOut">
               <a:rPr lang="en-US" smtClean="0"/>
-              <a:t>4/26/2019</a:t>
+              <a:t>5/9/19</a:t>
             </a:fld>
             <a:endParaRPr lang="en-US"/>
           </a:p>
@@ -1818,7 +1818,7 @@
           <a:p>
             <a:fld id="{9A35B5DD-C362-4A4F-89C2-BFD6EBD4AFC4}" type="datetimeFigureOut">
               <a:rPr lang="en-US" smtClean="0"/>
-              <a:t>4/26/2019</a:t>
+              <a:t>5/9/19</a:t>
             </a:fld>
             <a:endParaRPr lang="en-US"/>
           </a:p>
@@ -1959,7 +1959,7 @@
           <a:p>
             <a:fld id="{9A35B5DD-C362-4A4F-89C2-BFD6EBD4AFC4}" type="datetimeFigureOut">
               <a:rPr lang="en-US" smtClean="0"/>
-              <a:t>4/26/2019</a:t>
+              <a:t>5/9/19</a:t>
             </a:fld>
             <a:endParaRPr lang="en-US"/>
           </a:p>
@@ -2072,7 +2072,7 @@
           <a:p>
             <a:fld id="{9A35B5DD-C362-4A4F-89C2-BFD6EBD4AFC4}" type="datetimeFigureOut">
               <a:rPr lang="en-US" smtClean="0"/>
-              <a:t>4/26/2019</a:t>
+              <a:t>5/9/19</a:t>
             </a:fld>
             <a:endParaRPr lang="en-US"/>
           </a:p>
@@ -2383,7 +2383,7 @@
           <a:p>
             <a:fld id="{9A35B5DD-C362-4A4F-89C2-BFD6EBD4AFC4}" type="datetimeFigureOut">
               <a:rPr lang="en-US" smtClean="0"/>
-              <a:t>4/26/2019</a:t>
+              <a:t>5/9/19</a:t>
             </a:fld>
             <a:endParaRPr lang="en-US"/>
           </a:p>
@@ -2671,7 +2671,7 @@
           <a:p>
             <a:fld id="{9A35B5DD-C362-4A4F-89C2-BFD6EBD4AFC4}" type="datetimeFigureOut">
               <a:rPr lang="en-US" smtClean="0"/>
-              <a:t>4/26/2019</a:t>
+              <a:t>5/9/19</a:t>
             </a:fld>
             <a:endParaRPr lang="en-US"/>
           </a:p>
@@ -2912,7 +2912,7 @@
           <a:p>
             <a:fld id="{9A35B5DD-C362-4A4F-89C2-BFD6EBD4AFC4}" type="datetimeFigureOut">
               <a:rPr lang="en-US" smtClean="0"/>
-              <a:t>4/26/2019</a:t>
+              <a:t>5/9/19</a:t>
             </a:fld>
             <a:endParaRPr lang="en-US"/>
           </a:p>
@@ -4042,7 +4042,7 @@
             <a:pPr algn="ctr"/>
             <a:r>
               <a:rPr lang="en-US" dirty="0"/>
-              <a:t>Final</a:t>
+              <a:t>AIDS</a:t>
             </a:r>
           </a:p>
         </p:txBody>
@@ -5157,7 +5157,7 @@
             <a:pPr algn="ctr"/>
             <a:r>
               <a:rPr lang="en-US" dirty="0"/>
-              <a:t>Final</a:t>
+              <a:t>AIDS</a:t>
             </a:r>
             <a:br>
               <a:rPr lang="en-US" dirty="0"/>
@@ -5868,7 +5868,7 @@
             <a:pPr algn="ctr"/>
             <a:r>
               <a:rPr lang="en-US" dirty="0"/>
-              <a:t>Final</a:t>
+              <a:t>AIDS</a:t>
             </a:r>
             <a:br>
               <a:rPr lang="en-US" dirty="0"/>

</xml_diff>